<commit_message>
slides changes, added P.L.A.C.E.
</commit_message>
<xml_diff>
--- a/Documents/Presentation.pptx
+++ b/Documents/Presentation.pptx
@@ -159,7 +159,7 @@
   </p:defaultTextStyle>
   <p:extLst>
     <p:ext uri="{EFAFB233-063F-42B5-8137-9DF3F51BA10A}">
-      <p15:sldGuideLst xmlns:p15="http://schemas.microsoft.com/office/powerpoint/2012/main" xmlns="">
+      <p15:sldGuideLst xmlns="" xmlns:p15="http://schemas.microsoft.com/office/powerpoint/2012/main">
         <p15:guide id="1" orient="horz" pos="2160">
           <p15:clr>
             <a:srgbClr val="A4A3A4"/>
@@ -173,7 +173,7 @@
       </p15:sldGuideLst>
     </p:ext>
     <p:ext uri="{2D200454-40CA-4A62-9FC3-DE9A4176ACB9}">
-      <p15:notesGuideLst xmlns:p15="http://schemas.microsoft.com/office/powerpoint/2012/main" xmlns="">
+      <p15:notesGuideLst xmlns="" xmlns:p15="http://schemas.microsoft.com/office/powerpoint/2012/main">
         <p15:guide id="1" orient="horz" pos="2100">
           <p15:clr>
             <a:srgbClr val="A4A3A4"/>
@@ -9223,7 +9223,7 @@
           <p:cNvPr id="2" name="Content Placeholder 1">
             <a:extLst>
               <a:ext uri="{FF2B5EF4-FFF2-40B4-BE49-F238E27FC236}">
-                <a16:creationId xmlns:a16="http://schemas.microsoft.com/office/drawing/2014/main" xmlns="" id="{837CDBC3-F6DD-4A4B-9F9B-77A91F06ED37}"/>
+                <a16:creationId xmlns="" xmlns:a16="http://schemas.microsoft.com/office/drawing/2014/main" id="{837CDBC3-F6DD-4A4B-9F9B-77A91F06ED37}"/>
               </a:ext>
             </a:extLst>
           </p:cNvPr>
@@ -9327,7 +9327,7 @@
           <p:cNvPr id="3" name="Slide Number Placeholder 2">
             <a:extLst>
               <a:ext uri="{FF2B5EF4-FFF2-40B4-BE49-F238E27FC236}">
-                <a16:creationId xmlns:a16="http://schemas.microsoft.com/office/drawing/2014/main" xmlns="" id="{C2EF762E-CA48-46BE-8D11-A73C05E82893}"/>
+                <a16:creationId xmlns="" xmlns:a16="http://schemas.microsoft.com/office/drawing/2014/main" id="{C2EF762E-CA48-46BE-8D11-A73C05E82893}"/>
               </a:ext>
             </a:extLst>
           </p:cNvPr>
@@ -9357,7 +9357,7 @@
           <p:cNvPr id="5" name="Title 4">
             <a:extLst>
               <a:ext uri="{FF2B5EF4-FFF2-40B4-BE49-F238E27FC236}">
-                <a16:creationId xmlns:a16="http://schemas.microsoft.com/office/drawing/2014/main" xmlns="" id="{C5413366-2BCD-4191-8ADB-E371C13280FC}"/>
+                <a16:creationId xmlns="" xmlns:a16="http://schemas.microsoft.com/office/drawing/2014/main" id="{C5413366-2BCD-4191-8ADB-E371C13280FC}"/>
               </a:ext>
             </a:extLst>
           </p:cNvPr>
@@ -10369,7 +10369,11 @@
             </a:r>
             <a:r>
               <a:rPr lang="en-US" dirty="0"/>
-              <a:t>Person perspective</a:t>
+              <a:t>Person </a:t>
+            </a:r>
+            <a:r>
+              <a:rPr lang="en-US" dirty="0" smtClean="0"/>
+              <a:t>perspective</a:t>
             </a:r>
           </a:p>
           <a:p>
@@ -10377,10 +10381,7 @@
               <a:buFont typeface="Arial" panose="020B0604020202020204" pitchFamily="34" charset="0"/>
               <a:buChar char="•"/>
             </a:pPr>
-            <a:r>
-              <a:rPr lang="en-US" dirty="0"/>
-              <a:t>Beamer as screen</a:t>
-            </a:r>
+            <a:endParaRPr lang="en-US" dirty="0"/>
           </a:p>
           <a:p>
             <a:pPr marL="285750" indent="-285750">
@@ -10389,7 +10390,11 @@
             </a:pPr>
             <a:r>
               <a:rPr lang="en-US" dirty="0"/>
-              <a:t>Support left and right hand when possible</a:t>
+              <a:t>Beamer as </a:t>
+            </a:r>
+            <a:r>
+              <a:rPr lang="en-US" dirty="0" smtClean="0"/>
+              <a:t>screen</a:t>
             </a:r>
           </a:p>
           <a:p>
@@ -10397,8 +10402,36 @@
               <a:buFont typeface="Arial" panose="020B0604020202020204" pitchFamily="34" charset="0"/>
               <a:buChar char="•"/>
             </a:pPr>
-            <a:r>
-              <a:rPr lang="en-US" dirty="0" err="1"/>
+            <a:endParaRPr lang="en-US" dirty="0"/>
+          </a:p>
+          <a:p>
+            <a:pPr marL="285750" indent="-285750">
+              <a:buFont typeface="Arial" panose="020B0604020202020204" pitchFamily="34" charset="0"/>
+              <a:buChar char="•"/>
+            </a:pPr>
+            <a:r>
+              <a:rPr lang="en-US" dirty="0"/>
+              <a:t>Support left and right hand when </a:t>
+            </a:r>
+            <a:r>
+              <a:rPr lang="en-US" dirty="0" smtClean="0"/>
+              <a:t>possible</a:t>
+            </a:r>
+          </a:p>
+          <a:p>
+            <a:pPr marL="285750" indent="-285750">
+              <a:buFont typeface="Arial" panose="020B0604020202020204" pitchFamily="34" charset="0"/>
+              <a:buChar char="•"/>
+            </a:pPr>
+            <a:endParaRPr lang="en-US" dirty="0"/>
+          </a:p>
+          <a:p>
+            <a:pPr marL="285750" indent="-285750">
+              <a:buFont typeface="Arial" panose="020B0604020202020204" pitchFamily="34" charset="0"/>
+              <a:buChar char="•"/>
+            </a:pPr>
+            <a:r>
+              <a:rPr lang="en-US" dirty="0" err="1" smtClean="0"/>
               <a:t>Minigames</a:t>
             </a:r>
             <a:endParaRPr lang="en-US" dirty="0"/>
@@ -10410,19 +10443,8 @@
             </a:pPr>
             <a:r>
               <a:rPr lang="en-US" dirty="0" smtClean="0"/>
-              <a:t>Gestures </a:t>
-            </a:r>
-            <a:r>
-              <a:rPr lang="en-US" dirty="0"/>
-              <a:t>(2-3/game)</a:t>
-            </a:r>
-            <a:endParaRPr lang="en-US" dirty="0">
-              <a:solidFill>
-                <a:schemeClr val="bg1">
-                  <a:lumMod val="75000"/>
-                </a:schemeClr>
-              </a:solidFill>
-            </a:endParaRPr>
+              <a:t>Gestures, steering, interact with objects</a:t>
+            </a:r>
           </a:p>
           <a:p>
             <a:pPr marL="461963" lvl="1" indent="-285750">
@@ -10430,8 +10452,12 @@
               <a:buChar char="•"/>
             </a:pPr>
             <a:r>
+              <a:rPr lang="en-US" dirty="0" smtClean="0"/>
+              <a:t>Points </a:t>
+            </a:r>
+            <a:r>
               <a:rPr lang="en-US" dirty="0"/>
-              <a:t>Points for good performance</a:t>
+              <a:t>for good performance</a:t>
             </a:r>
           </a:p>
           <a:p>
@@ -11504,8 +11530,18 @@
             </a:pPr>
             <a:r>
               <a:rPr lang="en-US" dirty="0"/>
-              <a:t>Balance a tablet (Do not let items fall off)</a:t>
-            </a:r>
+              <a:t>Balance a tablet (Do not let items fall off</a:t>
+            </a:r>
+            <a:r>
+              <a:rPr lang="en-US" dirty="0" smtClean="0"/>
+              <a:t>)</a:t>
+            </a:r>
+          </a:p>
+          <a:p>
+            <a:pPr lvl="1" indent="0">
+              <a:buNone/>
+            </a:pPr>
+            <a:endParaRPr lang="en-US" dirty="0"/>
           </a:p>
           <a:p>
             <a:pPr marL="285750" indent="-285750">
@@ -12631,8 +12667,18 @@
             </a:pPr>
             <a:r>
               <a:rPr lang="en-US" b="1" dirty="0"/>
-              <a:t>Balance a tablet (Do not let items fall off)</a:t>
-            </a:r>
+              <a:t>Balance a tablet (Do not let items fall off</a:t>
+            </a:r>
+            <a:r>
+              <a:rPr lang="en-US" b="1" dirty="0" smtClean="0"/>
+              <a:t>)</a:t>
+            </a:r>
+          </a:p>
+          <a:p>
+            <a:pPr lvl="1" indent="0">
+              <a:buNone/>
+            </a:pPr>
+            <a:endParaRPr lang="en-US" b="1" dirty="0"/>
           </a:p>
           <a:p>
             <a:pPr marL="285750" indent="-285750">
@@ -14194,8 +14240,19 @@
             </a:pPr>
             <a:r>
               <a:rPr lang="en-US" dirty="0"/>
-              <a:t>Tracing the rabbit requires much more precise movement</a:t>
-            </a:r>
+              <a:t>Tracing the rabbit requires much more precise </a:t>
+            </a:r>
+            <a:r>
+              <a:rPr lang="en-US" dirty="0" smtClean="0"/>
+              <a:t>movement</a:t>
+            </a:r>
+          </a:p>
+          <a:p>
+            <a:pPr marL="461963" lvl="1" indent="-285750">
+              <a:buFont typeface="Arial" panose="020B0604020202020204" pitchFamily="34" charset="0"/>
+              <a:buChar char="•"/>
+            </a:pPr>
+            <a:endParaRPr lang="en-US" dirty="0"/>
           </a:p>
           <a:p>
             <a:pPr marL="285750" indent="-285750">
@@ -16560,7 +16617,7 @@
   <a:extraClrSchemeLst/>
   <a:extLst>
     <a:ext uri="{05A4C25C-085E-4340-85A3-A5531E510DB2}">
-      <thm15:themeFamily xmlns:thm15="http://schemas.microsoft.com/office/thememl/2012/main" xmlns="" name="Präsentation14" id="{B1B10406-6147-4A47-95F4-F5DBD10A3872}" vid="{D4FD95B4-ED9B-E343-B70F-8C404733D84C}"/>
+      <thm15:themeFamily xmlns="" xmlns:thm15="http://schemas.microsoft.com/office/thememl/2012/main" name="Präsentation14" id="{B1B10406-6147-4A47-95F4-F5DBD10A3872}" vid="{D4FD95B4-ED9B-E343-B70F-8C404733D84C}"/>
     </a:ext>
   </a:extLst>
 </a:theme>
@@ -16846,7 +16903,7 @@
   <a:extraClrSchemeLst/>
   <a:extLst>
     <a:ext uri="{05A4C25C-085E-4340-85A3-A5531E510DB2}">
-      <thm15:themeFamily xmlns:thm15="http://schemas.microsoft.com/office/thememl/2012/main" xmlns="" name="Präsentation14" id="{B1B10406-6147-4A47-95F4-F5DBD10A3872}" vid="{E7490A93-BEAC-FC49-93F3-0CC1118C542C}"/>
+      <thm15:themeFamily xmlns="" xmlns:thm15="http://schemas.microsoft.com/office/thememl/2012/main" name="Präsentation14" id="{B1B10406-6147-4A47-95F4-F5DBD10A3872}" vid="{E7490A93-BEAC-FC49-93F3-0CC1118C542C}"/>
     </a:ext>
   </a:extLst>
 </a:theme>
@@ -17132,7 +17189,7 @@
   <a:extraClrSchemeLst/>
   <a:extLst>
     <a:ext uri="{05A4C25C-085E-4340-85A3-A5531E510DB2}">
-      <thm15:themeFamily xmlns:thm15="http://schemas.microsoft.com/office/thememl/2012/main" xmlns="" name="Präsentation14" id="{B1B10406-6147-4A47-95F4-F5DBD10A3872}" vid="{4DDB14AD-D1C4-854B-AC86-049FDE8761EC}"/>
+      <thm15:themeFamily xmlns="" xmlns:thm15="http://schemas.microsoft.com/office/thememl/2012/main" name="Präsentation14" id="{B1B10406-6147-4A47-95F4-F5DBD10A3872}" vid="{4DDB14AD-D1C4-854B-AC86-049FDE8761EC}"/>
     </a:ext>
   </a:extLst>
 </a:theme>
@@ -17418,7 +17475,7 @@
   <a:extraClrSchemeLst/>
   <a:extLst>
     <a:ext uri="{05A4C25C-085E-4340-85A3-A5531E510DB2}">
-      <thm15:themeFamily xmlns:thm15="http://schemas.microsoft.com/office/thememl/2012/main" xmlns="" name="Präsentation14" id="{B1B10406-6147-4A47-95F4-F5DBD10A3872}" vid="{4F4851FE-32D1-2D41-BECA-D90EB3BB8DB1}"/>
+      <thm15:themeFamily xmlns="" xmlns:thm15="http://schemas.microsoft.com/office/thememl/2012/main" name="Präsentation14" id="{B1B10406-6147-4A47-95F4-F5DBD10A3872}" vid="{4F4851FE-32D1-2D41-BECA-D90EB3BB8DB1}"/>
     </a:ext>
   </a:extLst>
 </a:theme>
@@ -17704,7 +17761,7 @@
   <a:extraClrSchemeLst/>
   <a:extLst>
     <a:ext uri="{05A4C25C-085E-4340-85A3-A5531E510DB2}">
-      <thm15:themeFamily xmlns:thm15="http://schemas.microsoft.com/office/thememl/2012/main" xmlns="" name="Präsentation14" id="{B1B10406-6147-4A47-95F4-F5DBD10A3872}" vid="{13591B48-8E13-6247-8040-92522EC77656}"/>
+      <thm15:themeFamily xmlns="" xmlns:thm15="http://schemas.microsoft.com/office/thememl/2012/main" name="Präsentation14" id="{B1B10406-6147-4A47-95F4-F5DBD10A3872}" vid="{13591B48-8E13-6247-8040-92522EC77656}"/>
     </a:ext>
   </a:extLst>
 </a:theme>
@@ -17990,7 +18047,7 @@
   <a:extraClrSchemeLst/>
   <a:extLst>
     <a:ext uri="{05A4C25C-085E-4340-85A3-A5531E510DB2}">
-      <thm15:themeFamily xmlns:thm15="http://schemas.microsoft.com/office/thememl/2012/main" xmlns="" name="Präsentation14" id="{B1B10406-6147-4A47-95F4-F5DBD10A3872}" vid="{BAD62DF3-579B-3B4C-BB35-887AD0E01A2D}"/>
+      <thm15:themeFamily xmlns="" xmlns:thm15="http://schemas.microsoft.com/office/thememl/2012/main" name="Präsentation14" id="{B1B10406-6147-4A47-95F4-F5DBD10A3872}" vid="{BAD62DF3-579B-3B4C-BB35-887AD0E01A2D}"/>
     </a:ext>
   </a:extLst>
 </a:theme>

</xml_diff>

<commit_message>
trapdoor text, activated apply root motion for dancers
</commit_message>
<xml_diff>
--- a/Documents/Presentation.pptx
+++ b/Documents/Presentation.pptx
@@ -159,7 +159,7 @@
   </p:defaultTextStyle>
   <p:extLst>
     <p:ext uri="{EFAFB233-063F-42B5-8137-9DF3F51BA10A}">
-      <p15:sldGuideLst xmlns:p15="http://schemas.microsoft.com/office/powerpoint/2012/main" xmlns="">
+      <p15:sldGuideLst xmlns="" xmlns:p15="http://schemas.microsoft.com/office/powerpoint/2012/main">
         <p15:guide id="1" orient="horz" pos="2160">
           <p15:clr>
             <a:srgbClr val="A4A3A4"/>
@@ -173,7 +173,7 @@
       </p15:sldGuideLst>
     </p:ext>
     <p:ext uri="{2D200454-40CA-4A62-9FC3-DE9A4176ACB9}">
-      <p15:notesGuideLst xmlns:p15="http://schemas.microsoft.com/office/powerpoint/2012/main" xmlns="">
+      <p15:notesGuideLst xmlns="" xmlns:p15="http://schemas.microsoft.com/office/powerpoint/2012/main">
         <p15:guide id="1" orient="horz" pos="2100">
           <p15:clr>
             <a:srgbClr val="A4A3A4"/>
@@ -9223,7 +9223,7 @@
           <p:cNvPr id="2" name="Content Placeholder 1">
             <a:extLst>
               <a:ext uri="{FF2B5EF4-FFF2-40B4-BE49-F238E27FC236}">
-                <a16:creationId xmlns:a16="http://schemas.microsoft.com/office/drawing/2014/main" xmlns="" id="{837CDBC3-F6DD-4A4B-9F9B-77A91F06ED37}"/>
+                <a16:creationId xmlns="" xmlns:a16="http://schemas.microsoft.com/office/drawing/2014/main" id="{837CDBC3-F6DD-4A4B-9F9B-77A91F06ED37}"/>
               </a:ext>
             </a:extLst>
           </p:cNvPr>
@@ -9327,7 +9327,7 @@
           <p:cNvPr id="3" name="Slide Number Placeholder 2">
             <a:extLst>
               <a:ext uri="{FF2B5EF4-FFF2-40B4-BE49-F238E27FC236}">
-                <a16:creationId xmlns:a16="http://schemas.microsoft.com/office/drawing/2014/main" xmlns="" id="{C2EF762E-CA48-46BE-8D11-A73C05E82893}"/>
+                <a16:creationId xmlns="" xmlns:a16="http://schemas.microsoft.com/office/drawing/2014/main" id="{C2EF762E-CA48-46BE-8D11-A73C05E82893}"/>
               </a:ext>
             </a:extLst>
           </p:cNvPr>
@@ -9357,7 +9357,7 @@
           <p:cNvPr id="5" name="Title 4">
             <a:extLst>
               <a:ext uri="{FF2B5EF4-FFF2-40B4-BE49-F238E27FC236}">
-                <a16:creationId xmlns:a16="http://schemas.microsoft.com/office/drawing/2014/main" xmlns="" id="{C5413366-2BCD-4191-8ADB-E371C13280FC}"/>
+                <a16:creationId xmlns="" xmlns:a16="http://schemas.microsoft.com/office/drawing/2014/main" id="{C5413366-2BCD-4191-8ADB-E371C13280FC}"/>
               </a:ext>
             </a:extLst>
           </p:cNvPr>
@@ -9418,6 +9418,13 @@
   <p:clrMapOvr>
     <a:masterClrMapping/>
   </p:clrMapOvr>
+  <p:timing>
+    <p:tnLst>
+      <p:par>
+        <p:cTn id="1" dur="indefinite" restart="never" nodeType="tmRoot"/>
+      </p:par>
+    </p:tnLst>
+  </p:timing>
 </p:sld>
 </file>
 
@@ -9579,6 +9586,13 @@
   <p:clrMapOvr>
     <a:masterClrMapping/>
   </p:clrMapOvr>
+  <p:timing>
+    <p:tnLst>
+      <p:par>
+        <p:cTn id="1" dur="indefinite" restart="never" nodeType="tmRoot"/>
+      </p:par>
+    </p:tnLst>
+  </p:timing>
 </p:sld>
 </file>
 
@@ -9717,6 +9731,13 @@
   <p:clrMapOvr>
     <a:masterClrMapping/>
   </p:clrMapOvr>
+  <p:timing>
+    <p:tnLst>
+      <p:par>
+        <p:cTn id="1" dur="indefinite" restart="never" nodeType="tmRoot"/>
+      </p:par>
+    </p:tnLst>
+  </p:timing>
 </p:sld>
 </file>
 
@@ -9882,6 +9903,13 @@
   <p:clrMapOvr>
     <a:masterClrMapping/>
   </p:clrMapOvr>
+  <p:timing>
+    <p:tnLst>
+      <p:par>
+        <p:cTn id="1" dur="indefinite" restart="never" nodeType="tmRoot"/>
+      </p:par>
+    </p:tnLst>
+  </p:timing>
 </p:sld>
 </file>
 
@@ -16675,7 +16703,7 @@
   <a:extraClrSchemeLst/>
   <a:extLst>
     <a:ext uri="{05A4C25C-085E-4340-85A3-A5531E510DB2}">
-      <thm15:themeFamily xmlns:thm15="http://schemas.microsoft.com/office/thememl/2012/main" xmlns="" name="Präsentation14" id="{B1B10406-6147-4A47-95F4-F5DBD10A3872}" vid="{D4FD95B4-ED9B-E343-B70F-8C404733D84C}"/>
+      <thm15:themeFamily xmlns="" xmlns:thm15="http://schemas.microsoft.com/office/thememl/2012/main" name="Präsentation14" id="{B1B10406-6147-4A47-95F4-F5DBD10A3872}" vid="{D4FD95B4-ED9B-E343-B70F-8C404733D84C}"/>
     </a:ext>
   </a:extLst>
 </a:theme>
@@ -16961,7 +16989,7 @@
   <a:extraClrSchemeLst/>
   <a:extLst>
     <a:ext uri="{05A4C25C-085E-4340-85A3-A5531E510DB2}">
-      <thm15:themeFamily xmlns:thm15="http://schemas.microsoft.com/office/thememl/2012/main" xmlns="" name="Präsentation14" id="{B1B10406-6147-4A47-95F4-F5DBD10A3872}" vid="{E7490A93-BEAC-FC49-93F3-0CC1118C542C}"/>
+      <thm15:themeFamily xmlns="" xmlns:thm15="http://schemas.microsoft.com/office/thememl/2012/main" name="Präsentation14" id="{B1B10406-6147-4A47-95F4-F5DBD10A3872}" vid="{E7490A93-BEAC-FC49-93F3-0CC1118C542C}"/>
     </a:ext>
   </a:extLst>
 </a:theme>
@@ -17247,7 +17275,7 @@
   <a:extraClrSchemeLst/>
   <a:extLst>
     <a:ext uri="{05A4C25C-085E-4340-85A3-A5531E510DB2}">
-      <thm15:themeFamily xmlns:thm15="http://schemas.microsoft.com/office/thememl/2012/main" xmlns="" name="Präsentation14" id="{B1B10406-6147-4A47-95F4-F5DBD10A3872}" vid="{4DDB14AD-D1C4-854B-AC86-049FDE8761EC}"/>
+      <thm15:themeFamily xmlns="" xmlns:thm15="http://schemas.microsoft.com/office/thememl/2012/main" name="Präsentation14" id="{B1B10406-6147-4A47-95F4-F5DBD10A3872}" vid="{4DDB14AD-D1C4-854B-AC86-049FDE8761EC}"/>
     </a:ext>
   </a:extLst>
 </a:theme>
@@ -17533,7 +17561,7 @@
   <a:extraClrSchemeLst/>
   <a:extLst>
     <a:ext uri="{05A4C25C-085E-4340-85A3-A5531E510DB2}">
-      <thm15:themeFamily xmlns:thm15="http://schemas.microsoft.com/office/thememl/2012/main" xmlns="" name="Präsentation14" id="{B1B10406-6147-4A47-95F4-F5DBD10A3872}" vid="{4F4851FE-32D1-2D41-BECA-D90EB3BB8DB1}"/>
+      <thm15:themeFamily xmlns="" xmlns:thm15="http://schemas.microsoft.com/office/thememl/2012/main" name="Präsentation14" id="{B1B10406-6147-4A47-95F4-F5DBD10A3872}" vid="{4F4851FE-32D1-2D41-BECA-D90EB3BB8DB1}"/>
     </a:ext>
   </a:extLst>
 </a:theme>
@@ -17819,7 +17847,7 @@
   <a:extraClrSchemeLst/>
   <a:extLst>
     <a:ext uri="{05A4C25C-085E-4340-85A3-A5531E510DB2}">
-      <thm15:themeFamily xmlns:thm15="http://schemas.microsoft.com/office/thememl/2012/main" xmlns="" name="Präsentation14" id="{B1B10406-6147-4A47-95F4-F5DBD10A3872}" vid="{13591B48-8E13-6247-8040-92522EC77656}"/>
+      <thm15:themeFamily xmlns="" xmlns:thm15="http://schemas.microsoft.com/office/thememl/2012/main" name="Präsentation14" id="{B1B10406-6147-4A47-95F4-F5DBD10A3872}" vid="{13591B48-8E13-6247-8040-92522EC77656}"/>
     </a:ext>
   </a:extLst>
 </a:theme>
@@ -18105,7 +18133,7 @@
   <a:extraClrSchemeLst/>
   <a:extLst>
     <a:ext uri="{05A4C25C-085E-4340-85A3-A5531E510DB2}">
-      <thm15:themeFamily xmlns:thm15="http://schemas.microsoft.com/office/thememl/2012/main" xmlns="" name="Präsentation14" id="{B1B10406-6147-4A47-95F4-F5DBD10A3872}" vid="{BAD62DF3-579B-3B4C-BB35-887AD0E01A2D}"/>
+      <thm15:themeFamily xmlns="" xmlns:thm15="http://schemas.microsoft.com/office/thememl/2012/main" name="Präsentation14" id="{B1B10406-6147-4A47-95F4-F5DBD10A3872}" vid="{BAD62DF3-579B-3B4C-BB35-887AD0E01A2D}"/>
     </a:ext>
   </a:extLst>
 </a:theme>

</xml_diff>